<commit_message>
HRVs_connecitivity compressed and some figs
</commit_message>
<xml_diff>
--- a/figures/Graphics/SomeGraphics.pptx
+++ b/figures/Graphics/SomeGraphics.pptx
@@ -115,12 +115,33 @@
 </p:presentation>
 </file>
 
-<file path=ppt/revisionInfo.xml><?xml version="1.0" encoding="utf-8"?>
-<p1510:revInfo xmlns:a="http://schemas.openxmlformats.org/drawingml/2006/main" xmlns:r="http://schemas.openxmlformats.org/officeDocument/2006/relationships" xmlns:p1510="http://schemas.microsoft.com/office/powerpoint/2015/10/main">
-  <p1510:revLst>
-    <p1510:client id="{3A1262AB-1F8D-4FD2-BFA0-C11EA156C15A}" v="184" dt="2023-03-17T11:12:39.910"/>
-  </p1510:revLst>
-</p1510:revInfo>
+<file path=ppt/changesInfos/changesInfo1.xml><?xml version="1.0" encoding="utf-8"?>
+<pc:chgInfo xmlns:a="http://schemas.openxmlformats.org/drawingml/2006/main" xmlns:r="http://schemas.openxmlformats.org/officeDocument/2006/relationships" xmlns:ac="http://schemas.microsoft.com/office/drawing/2013/main/command" xmlns:pc="http://schemas.microsoft.com/office/powerpoint/2013/main/command">
+  <pc:docChgLst>
+    <pc:chgData name="Veroni, Stefano" userId="c6a0b827-0823-4cdd-9f2f-b443de65f065" providerId="ADAL" clId="{7172C2B0-00A1-4C47-8B68-DE5542B37B68}"/>
+    <pc:docChg chg="undo custSel modSld">
+      <pc:chgData name="Veroni, Stefano" userId="c6a0b827-0823-4cdd-9f2f-b443de65f065" providerId="ADAL" clId="{7172C2B0-00A1-4C47-8B68-DE5542B37B68}" dt="2023-04-17T18:24:24.933" v="1" actId="207"/>
+      <pc:docMkLst>
+        <pc:docMk/>
+      </pc:docMkLst>
+      <pc:sldChg chg="modSp mod">
+        <pc:chgData name="Veroni, Stefano" userId="c6a0b827-0823-4cdd-9f2f-b443de65f065" providerId="ADAL" clId="{7172C2B0-00A1-4C47-8B68-DE5542B37B68}" dt="2023-04-17T18:24:24.933" v="1" actId="207"/>
+        <pc:sldMkLst>
+          <pc:docMk/>
+          <pc:sldMk cId="1272041760" sldId="262"/>
+        </pc:sldMkLst>
+        <pc:spChg chg="mod">
+          <ac:chgData name="Veroni, Stefano" userId="c6a0b827-0823-4cdd-9f2f-b443de65f065" providerId="ADAL" clId="{7172C2B0-00A1-4C47-8B68-DE5542B37B68}" dt="2023-04-17T18:24:24.933" v="1" actId="207"/>
+          <ac:spMkLst>
+            <pc:docMk/>
+            <pc:sldMk cId="1272041760" sldId="262"/>
+            <ac:spMk id="7" creationId="{D4C2CF9E-1968-AA27-B898-915B2EB3AA28}"/>
+          </ac:spMkLst>
+        </pc:spChg>
+      </pc:sldChg>
+    </pc:docChg>
+  </pc:docChgLst>
+</pc:chgInfo>
 </file>
 
 <file path=ppt/slideLayouts/slideLayout1.xml><?xml version="1.0" encoding="utf-8"?>
@@ -272,7 +293,7 @@
           <a:p>
             <a:fld id="{963F2B44-91F8-4592-BE4C-F14CCDDE1056}" type="datetimeFigureOut">
               <a:rPr lang="en-GB" smtClean="0"/>
-              <a:t>17/03/2023</a:t>
+              <a:t>17/04/2023</a:t>
             </a:fld>
             <a:endParaRPr lang="en-GB"/>
           </a:p>
@@ -472,7 +493,7 @@
           <a:p>
             <a:fld id="{963F2B44-91F8-4592-BE4C-F14CCDDE1056}" type="datetimeFigureOut">
               <a:rPr lang="en-GB" smtClean="0"/>
-              <a:t>17/03/2023</a:t>
+              <a:t>17/04/2023</a:t>
             </a:fld>
             <a:endParaRPr lang="en-GB"/>
           </a:p>
@@ -682,7 +703,7 @@
           <a:p>
             <a:fld id="{963F2B44-91F8-4592-BE4C-F14CCDDE1056}" type="datetimeFigureOut">
               <a:rPr lang="en-GB" smtClean="0"/>
-              <a:t>17/03/2023</a:t>
+              <a:t>17/04/2023</a:t>
             </a:fld>
             <a:endParaRPr lang="en-GB"/>
           </a:p>
@@ -882,7 +903,7 @@
           <a:p>
             <a:fld id="{963F2B44-91F8-4592-BE4C-F14CCDDE1056}" type="datetimeFigureOut">
               <a:rPr lang="en-GB" smtClean="0"/>
-              <a:t>17/03/2023</a:t>
+              <a:t>17/04/2023</a:t>
             </a:fld>
             <a:endParaRPr lang="en-GB"/>
           </a:p>
@@ -1158,7 +1179,7 @@
           <a:p>
             <a:fld id="{963F2B44-91F8-4592-BE4C-F14CCDDE1056}" type="datetimeFigureOut">
               <a:rPr lang="en-GB" smtClean="0"/>
-              <a:t>17/03/2023</a:t>
+              <a:t>17/04/2023</a:t>
             </a:fld>
             <a:endParaRPr lang="en-GB"/>
           </a:p>
@@ -1426,7 +1447,7 @@
           <a:p>
             <a:fld id="{963F2B44-91F8-4592-BE4C-F14CCDDE1056}" type="datetimeFigureOut">
               <a:rPr lang="en-GB" smtClean="0"/>
-              <a:t>17/03/2023</a:t>
+              <a:t>17/04/2023</a:t>
             </a:fld>
             <a:endParaRPr lang="en-GB"/>
           </a:p>
@@ -1841,7 +1862,7 @@
           <a:p>
             <a:fld id="{963F2B44-91F8-4592-BE4C-F14CCDDE1056}" type="datetimeFigureOut">
               <a:rPr lang="en-GB" smtClean="0"/>
-              <a:t>17/03/2023</a:t>
+              <a:t>17/04/2023</a:t>
             </a:fld>
             <a:endParaRPr lang="en-GB"/>
           </a:p>
@@ -1983,7 +2004,7 @@
           <a:p>
             <a:fld id="{963F2B44-91F8-4592-BE4C-F14CCDDE1056}" type="datetimeFigureOut">
               <a:rPr lang="en-GB" smtClean="0"/>
-              <a:t>17/03/2023</a:t>
+              <a:t>17/04/2023</a:t>
             </a:fld>
             <a:endParaRPr lang="en-GB"/>
           </a:p>
@@ -2096,7 +2117,7 @@
           <a:p>
             <a:fld id="{963F2B44-91F8-4592-BE4C-F14CCDDE1056}" type="datetimeFigureOut">
               <a:rPr lang="en-GB" smtClean="0"/>
-              <a:t>17/03/2023</a:t>
+              <a:t>17/04/2023</a:t>
             </a:fld>
             <a:endParaRPr lang="en-GB"/>
           </a:p>
@@ -2409,7 +2430,7 @@
           <a:p>
             <a:fld id="{963F2B44-91F8-4592-BE4C-F14CCDDE1056}" type="datetimeFigureOut">
               <a:rPr lang="en-GB" smtClean="0"/>
-              <a:t>17/03/2023</a:t>
+              <a:t>17/04/2023</a:t>
             </a:fld>
             <a:endParaRPr lang="en-GB"/>
           </a:p>
@@ -2698,7 +2719,7 @@
           <a:p>
             <a:fld id="{963F2B44-91F8-4592-BE4C-F14CCDDE1056}" type="datetimeFigureOut">
               <a:rPr lang="en-GB" smtClean="0"/>
-              <a:t>17/03/2023</a:t>
+              <a:t>17/04/2023</a:t>
             </a:fld>
             <a:endParaRPr lang="en-GB"/>
           </a:p>
@@ -2941,7 +2962,7 @@
           <a:p>
             <a:fld id="{963F2B44-91F8-4592-BE4C-F14CCDDE1056}" type="datetimeFigureOut">
               <a:rPr lang="en-GB" smtClean="0"/>
-              <a:t>17/03/2023</a:t>
+              <a:t>17/04/2023</a:t>
             </a:fld>
             <a:endParaRPr lang="en-GB"/>
           </a:p>

</xml_diff>